<commit_message>
Add brief intro to concept of project-oriented workflows
</commit_message>
<xml_diff>
--- a/Workshops/Workshop3.pptx
+++ b/Workshops/Workshop3.pptx
@@ -5,7 +5,7 @@
     <p:sldMasterId id="2147483648" r:id="rId1"/>
   </p:sldMasterIdLst>
   <p:notesMasterIdLst>
-    <p:NotesMasterId r:id="rId36"/>
+    <p:NotesMasterId r:id="rId38"/>
   </p:notesMasterIdLst>
   <p:sldIdLst>
     <p:sldId id="256" r:id="rId2"/>
@@ -42,6 +42,8 @@
     <p:sldId id="287" r:id="rId33"/>
     <p:sldId id="288" r:id="rId34"/>
     <p:sldId id="289" r:id="rId35"/>
+    <p:sldId id="290" r:id="rId36"/>
+    <p:sldId id="291" r:id="rId37"/>
   </p:sldIdLst>
   <p:sldSz cx="12192000" cy="6858000"/>
   <p:notesSz cx="6858000" cy="9144000"/>
@@ -869,7 +871,7 @@
           <a:p>
             <a:fld id="{18BDFEC3-8487-43E8-A154-7C12CBC1FFF2}" type="slidenum">
               <a:rPr lang="en-US"/>
-              <a:t>16</a:t>
+              <a:t>18</a:t>
             </a:fld>
             <a:endParaRPr lang="en-US"/>
           </a:p>
@@ -1007,7 +1009,7 @@
           <a:p>
             <a:fld id="{18BDFEC3-8487-43E8-A154-7C12CBC1FFF2}" type="slidenum">
               <a:rPr lang="en-US"/>
-              <a:t>28</a:t>
+              <a:t>30</a:t>
             </a:fld>
             <a:endParaRPr lang="en-US"/>
           </a:p>
@@ -4374,39 +4376,15 @@
             </a:pPr>
             <a:r>
               <a:rPr/>
-              <a:t>Getting</a:t>
-            </a:r>
-            <a:r>
-              <a:rPr/>
-              <a:t> </a:t>
-            </a:r>
-            <a:r>
-              <a:rPr/>
-              <a:t>your</a:t>
-            </a:r>
-            <a:r>
-              <a:rPr/>
-              <a:t> </a:t>
-            </a:r>
-            <a:r>
-              <a:rPr/>
-              <a:t>work</a:t>
-            </a:r>
-            <a:r>
-              <a:rPr/>
-              <a:t> </a:t>
-            </a:r>
-            <a:r>
-              <a:rPr/>
-              <a:t>into</a:t>
-            </a:r>
-            <a:r>
-              <a:rPr/>
-              <a:t> </a:t>
-            </a:r>
-            <a:r>
-              <a:rPr/>
-              <a:t>R</a:t>
+              <a:t>Brief</a:t>
+            </a:r>
+            <a:r>
+              <a:rPr/>
+              <a:t> </a:t>
+            </a:r>
+            <a:r>
+              <a:rPr/>
+              <a:t>interlude…</a:t>
             </a:r>
           </a:p>
         </p:txBody>
@@ -4437,69 +4415,21 @@
             </a:pPr>
             <a:r>
               <a:rPr/>
-              <a:t>There are 3 main methods</a:t>
-            </a:r>
-          </a:p>
-          <a:p>
-            <a:pPr lvl="1">
-              <a:buAutoNum type="arabicPeriod"/>
-            </a:pPr>
-            <a:r>
-              <a:rPr/>
-              <a:t>Point and click</a:t>
-            </a:r>
-          </a:p>
-          <a:p>
-            <a:pPr lvl="2"/>
-            <a:r>
-              <a:rPr/>
-              <a:t>Less fiddly as no need to write code</a:t>
-            </a:r>
-          </a:p>
-          <a:p>
-            <a:pPr lvl="2"/>
-            <a:r>
-              <a:rPr/>
-              <a:t>But not reproducible</a:t>
-            </a:r>
-          </a:p>
-          <a:p>
-            <a:pPr lvl="1">
-              <a:buAutoNum type="arabicPeriod"/>
-            </a:pPr>
-            <a:r>
-              <a:rPr/>
-              <a:t>Using commands</a:t>
-            </a:r>
-          </a:p>
-          <a:p>
-            <a:pPr lvl="2"/>
-            <a:r>
-              <a:rPr/>
-              <a:t>Better for reproducibility</a:t>
-            </a:r>
-          </a:p>
-          <a:p>
-            <a:pPr lvl="2"/>
-            <a:r>
-              <a:rPr/>
-              <a:t>Someone else would just have to replace the source code to run the code on their own computer</a:t>
-            </a:r>
-          </a:p>
-          <a:p>
-            <a:pPr lvl="1">
-              <a:buAutoNum type="arabicPeriod"/>
-            </a:pPr>
-            <a:r>
-              <a:rPr/>
-              <a:t>Connecting to an online database or google spreadsheet</a:t>
-            </a:r>
-          </a:p>
-          <a:p>
-            <a:pPr lvl="2"/>
-            <a:r>
-              <a:rPr/>
-              <a:t>This will only be mentioned in the handout</a:t>
+              <a:t>Common file path problems:</a:t>
+            </a:r>
+          </a:p>
+          <a:p>
+            <a:pPr lvl="1"/>
+            <a:r>
+              <a:rPr/>
+              <a:t>You want to run the same script on a different platform (e.g. Windows –&gt; UNIX), but the path to the data is now different.</a:t>
+            </a:r>
+          </a:p>
+          <a:p>
+            <a:pPr lvl="1"/>
+            <a:r>
+              <a:rPr/>
+              <a:t>You want to be able to easily switch between projects, which live in different directories, without having to change your working directory every time.</a:t>
             </a:r>
           </a:p>
         </p:txBody>
@@ -4510,6 +4440,319 @@
 </file>
 
 <file path=ppt/slides/slide11.xml><?xml version="1.0" encoding="utf-8"?>
+<p:sld xmlns:a="http://schemas.openxmlformats.org/drawingml/2006/main" xmlns:r="http://schemas.openxmlformats.org/officeDocument/2006/relationships" xmlns:p="http://schemas.openxmlformats.org/presentationml/2006/main">
+  <p:cSld>
+    <p:spTree>
+      <p:nvGrpSpPr>
+        <p:cNvPr id="1" name=""/>
+        <p:cNvGrpSpPr/>
+        <p:nvPr/>
+      </p:nvGrpSpPr>
+      <p:grpSpPr>
+        <a:xfrm>
+          <a:off x="0" y="0"/>
+          <a:ext cx="0" cy="0"/>
+          <a:chOff x="0" y="0"/>
+          <a:chExt cx="0" cy="0"/>
+        </a:xfrm>
+      </p:grpSpPr>
+      <p:sp>
+        <p:nvSpPr>
+          <p:cNvPr id="2" name="Title 1">
+            <a:extLst>
+              <a:ext uri="{FF2B5EF4-FFF2-40B4-BE49-F238E27FC236}">
+                <a16:creationId xmlns:a16="http://schemas.microsoft.com/office/drawing/2014/main" id="{5567D468-EE70-CD4E-A3AC-039CC11EF1FB}"/>
+              </a:ext>
+            </a:extLst>
+          </p:cNvPr>
+          <p:cNvSpPr>
+            <a:spLocks noGrp="1"/>
+          </p:cNvSpPr>
+          <p:nvPr>
+            <p:ph type="title"/>
+          </p:nvPr>
+        </p:nvSpPr>
+        <p:spPr/>
+        <p:txBody>
+          <a:bodyPr/>
+          <a:lstStyle/>
+          <a:p>
+            <a:pPr lvl="0" marL="0" indent="0">
+              <a:buNone/>
+            </a:pPr>
+            <a:r>
+              <a:rPr/>
+              <a:t>Brief</a:t>
+            </a:r>
+            <a:r>
+              <a:rPr/>
+              <a:t> </a:t>
+            </a:r>
+            <a:r>
+              <a:rPr/>
+              <a:t>interlude…</a:t>
+            </a:r>
+          </a:p>
+        </p:txBody>
+      </p:sp>
+      <p:sp>
+        <p:nvSpPr>
+          <p:cNvPr id="3" name="Content Placeholder 2">
+            <a:extLst>
+              <a:ext uri="{FF2B5EF4-FFF2-40B4-BE49-F238E27FC236}">
+                <a16:creationId xmlns:a16="http://schemas.microsoft.com/office/drawing/2014/main" id="{D10DDA37-E46B-B641-BC9F-636CB92A2C08}"/>
+              </a:ext>
+            </a:extLst>
+          </p:cNvPr>
+          <p:cNvSpPr>
+            <a:spLocks noGrp="1"/>
+          </p:cNvSpPr>
+          <p:nvPr>
+            <p:ph idx="1"/>
+          </p:nvPr>
+        </p:nvSpPr>
+        <p:spPr/>
+        <p:txBody>
+          <a:bodyPr/>
+          <a:lstStyle/>
+          <a:p>
+            <a:pPr lvl="0" marL="0" indent="0">
+              <a:buNone/>
+            </a:pPr>
+            <a:r>
+              <a:rPr/>
+              <a:t>The answer to this: “Project-oriented workflows”</a:t>
+            </a:r>
+          </a:p>
+          <a:p>
+            <a:pPr lvl="1"/>
+            <a:r>
+              <a:rPr>
+                <a:hlinkClick r:id="rId2"/>
+              </a:rPr>
+              <a:t>What They Forgot to Teach You About R</a:t>
+            </a:r>
+            <a:r>
+              <a:rPr/>
+              <a:t> – see Chapter 2 on Project-oriented workflows.</a:t>
+            </a:r>
+          </a:p>
+          <a:p>
+            <a:pPr lvl="1"/>
+            <a:r>
+              <a:rPr/>
+              <a:t>The package </a:t>
+            </a:r>
+            <a:r>
+              <a:rPr>
+                <a:hlinkClick r:id="rId3"/>
+              </a:rPr>
+              <a:t>here</a:t>
+            </a:r>
+            <a:r>
+              <a:rPr/>
+              <a:t> is an excellent package for making the most of project-oriented workflows.</a:t>
+            </a:r>
+          </a:p>
+          <a:p>
+            <a:pPr lvl="1"/>
+            <a:r>
+              <a:rPr/>
+              <a:t>And for the You-Tubers among you, check out: </a:t>
+            </a:r>
+            <a:r>
+              <a:rPr>
+                <a:hlinkClick r:id="rId4"/>
+              </a:rPr>
+              <a:t>Improve your workflow for reproducible science</a:t>
+            </a:r>
+          </a:p>
+        </p:txBody>
+      </p:sp>
+    </p:spTree>
+  </p:cSld>
+</p:sld>
+</file>
+
+<file path=ppt/slides/slide12.xml><?xml version="1.0" encoding="utf-8"?>
+<p:sld xmlns:a="http://schemas.openxmlformats.org/drawingml/2006/main" xmlns:r="http://schemas.openxmlformats.org/officeDocument/2006/relationships" xmlns:p="http://schemas.openxmlformats.org/presentationml/2006/main">
+  <p:cSld>
+    <p:spTree>
+      <p:nvGrpSpPr>
+        <p:cNvPr id="1" name=""/>
+        <p:cNvGrpSpPr/>
+        <p:nvPr/>
+      </p:nvGrpSpPr>
+      <p:grpSpPr>
+        <a:xfrm>
+          <a:off x="0" y="0"/>
+          <a:ext cx="0" cy="0"/>
+          <a:chOff x="0" y="0"/>
+          <a:chExt cx="0" cy="0"/>
+        </a:xfrm>
+      </p:grpSpPr>
+      <p:sp>
+        <p:nvSpPr>
+          <p:cNvPr id="2" name="Title 1">
+            <a:extLst>
+              <a:ext uri="{FF2B5EF4-FFF2-40B4-BE49-F238E27FC236}">
+                <a16:creationId xmlns:a16="http://schemas.microsoft.com/office/drawing/2014/main" id="{5567D468-EE70-CD4E-A3AC-039CC11EF1FB}"/>
+              </a:ext>
+            </a:extLst>
+          </p:cNvPr>
+          <p:cNvSpPr>
+            <a:spLocks noGrp="1"/>
+          </p:cNvSpPr>
+          <p:nvPr>
+            <p:ph type="title"/>
+          </p:nvPr>
+        </p:nvSpPr>
+        <p:spPr/>
+        <p:txBody>
+          <a:bodyPr/>
+          <a:lstStyle/>
+          <a:p>
+            <a:pPr lvl="0" marL="0" indent="0">
+              <a:buNone/>
+            </a:pPr>
+            <a:r>
+              <a:rPr/>
+              <a:t>Getting</a:t>
+            </a:r>
+            <a:r>
+              <a:rPr/>
+              <a:t> </a:t>
+            </a:r>
+            <a:r>
+              <a:rPr/>
+              <a:t>your</a:t>
+            </a:r>
+            <a:r>
+              <a:rPr/>
+              <a:t> </a:t>
+            </a:r>
+            <a:r>
+              <a:rPr/>
+              <a:t>work</a:t>
+            </a:r>
+            <a:r>
+              <a:rPr/>
+              <a:t> </a:t>
+            </a:r>
+            <a:r>
+              <a:rPr/>
+              <a:t>into</a:t>
+            </a:r>
+            <a:r>
+              <a:rPr/>
+              <a:t> </a:t>
+            </a:r>
+            <a:r>
+              <a:rPr/>
+              <a:t>R</a:t>
+            </a:r>
+          </a:p>
+        </p:txBody>
+      </p:sp>
+      <p:sp>
+        <p:nvSpPr>
+          <p:cNvPr id="3" name="Content Placeholder 2">
+            <a:extLst>
+              <a:ext uri="{FF2B5EF4-FFF2-40B4-BE49-F238E27FC236}">
+                <a16:creationId xmlns:a16="http://schemas.microsoft.com/office/drawing/2014/main" id="{D10DDA37-E46B-B641-BC9F-636CB92A2C08}"/>
+              </a:ext>
+            </a:extLst>
+          </p:cNvPr>
+          <p:cNvSpPr>
+            <a:spLocks noGrp="1"/>
+          </p:cNvSpPr>
+          <p:nvPr>
+            <p:ph idx="1"/>
+          </p:nvPr>
+        </p:nvSpPr>
+        <p:spPr/>
+        <p:txBody>
+          <a:bodyPr/>
+          <a:lstStyle/>
+          <a:p>
+            <a:pPr lvl="0" marL="0" indent="0">
+              <a:buNone/>
+            </a:pPr>
+            <a:r>
+              <a:rPr/>
+              <a:t>There are 3 main methods</a:t>
+            </a:r>
+          </a:p>
+          <a:p>
+            <a:pPr lvl="1">
+              <a:buAutoNum type="arabicPeriod"/>
+            </a:pPr>
+            <a:r>
+              <a:rPr/>
+              <a:t>Point and click</a:t>
+            </a:r>
+          </a:p>
+          <a:p>
+            <a:pPr lvl="2"/>
+            <a:r>
+              <a:rPr/>
+              <a:t>Less fiddly as no need to write code</a:t>
+            </a:r>
+          </a:p>
+          <a:p>
+            <a:pPr lvl="2"/>
+            <a:r>
+              <a:rPr/>
+              <a:t>But not reproducible</a:t>
+            </a:r>
+          </a:p>
+          <a:p>
+            <a:pPr lvl="1">
+              <a:buAutoNum type="arabicPeriod"/>
+            </a:pPr>
+            <a:r>
+              <a:rPr/>
+              <a:t>Using commands</a:t>
+            </a:r>
+          </a:p>
+          <a:p>
+            <a:pPr lvl="2"/>
+            <a:r>
+              <a:rPr/>
+              <a:t>Better for reproducibility</a:t>
+            </a:r>
+          </a:p>
+          <a:p>
+            <a:pPr lvl="2"/>
+            <a:r>
+              <a:rPr/>
+              <a:t>Someone else would just have to replace the source code to run the code on their own computer</a:t>
+            </a:r>
+          </a:p>
+          <a:p>
+            <a:pPr lvl="1">
+              <a:buAutoNum type="arabicPeriod"/>
+            </a:pPr>
+            <a:r>
+              <a:rPr/>
+              <a:t>Connecting to an online database or google spreadsheet</a:t>
+            </a:r>
+          </a:p>
+          <a:p>
+            <a:pPr lvl="2"/>
+            <a:r>
+              <a:rPr/>
+              <a:t>This will only be mentioned in the handout</a:t>
+            </a:r>
+          </a:p>
+        </p:txBody>
+      </p:sp>
+    </p:spTree>
+  </p:cSld>
+</p:sld>
+</file>
+
+<file path=ppt/slides/slide13.xml><?xml version="1.0" encoding="utf-8"?>
 <p:sld xmlns:a="http://schemas.openxmlformats.org/drawingml/2006/main" xmlns:r="http://schemas.openxmlformats.org/officeDocument/2006/relationships" xmlns:p="http://schemas.openxmlformats.org/presentationml/2006/main">
   <p:cSld>
     <p:spTree>
@@ -4675,7 +4918,7 @@
 </p:sld>
 </file>
 
-<file path=ppt/slides/slide12.xml><?xml version="1.0" encoding="utf-8"?>
+<file path=ppt/slides/slide14.xml><?xml version="1.0" encoding="utf-8"?>
 <p:sld xmlns:a="http://schemas.openxmlformats.org/drawingml/2006/main" xmlns:r="http://schemas.openxmlformats.org/officeDocument/2006/relationships" xmlns:p="http://schemas.openxmlformats.org/presentationml/2006/main">
   <p:cSld>
     <p:spTree>
@@ -4762,7 +5005,7 @@
 </p:sld>
 </file>
 
-<file path=ppt/slides/slide13.xml><?xml version="1.0" encoding="utf-8"?>
+<file path=ppt/slides/slide15.xml><?xml version="1.0" encoding="utf-8"?>
 <p:sld xmlns:a="http://schemas.openxmlformats.org/drawingml/2006/main" xmlns:r="http://schemas.openxmlformats.org/officeDocument/2006/relationships" xmlns:p="http://schemas.openxmlformats.org/presentationml/2006/main">
   <p:cSld>
     <p:spTree>
@@ -4913,7 +5156,7 @@
 </p:sld>
 </file>
 
-<file path=ppt/slides/slide14.xml><?xml version="1.0" encoding="utf-8"?>
+<file path=ppt/slides/slide16.xml><?xml version="1.0" encoding="utf-8"?>
 <p:sld xmlns:a="http://schemas.openxmlformats.org/drawingml/2006/main" xmlns:r="http://schemas.openxmlformats.org/officeDocument/2006/relationships" xmlns:p="http://schemas.openxmlformats.org/presentationml/2006/main">
   <p:cSld>
     <p:spTree>
@@ -5078,7 +5321,7 @@
 </p:sld>
 </file>
 
-<file path=ppt/slides/slide15.xml><?xml version="1.0" encoding="utf-8"?>
+<file path=ppt/slides/slide17.xml><?xml version="1.0" encoding="utf-8"?>
 <p:sld xmlns:a="http://schemas.openxmlformats.org/drawingml/2006/main" xmlns:r="http://schemas.openxmlformats.org/officeDocument/2006/relationships" xmlns:p="http://schemas.openxmlformats.org/presentationml/2006/main">
   <p:cSld>
     <p:spTree>
@@ -5263,7 +5506,7 @@
 </p:sld>
 </file>
 
-<file path=ppt/slides/slide16.xml><?xml version="1.0" encoding="utf-8"?>
+<file path=ppt/slides/slide18.xml><?xml version="1.0" encoding="utf-8"?>
 <p:sld xmlns:a="http://schemas.openxmlformats.org/drawingml/2006/main" xmlns:r="http://schemas.openxmlformats.org/officeDocument/2006/relationships" xmlns:p="http://schemas.openxmlformats.org/presentationml/2006/main">
   <p:cSld>
     <p:spTree>
@@ -5449,7 +5692,7 @@
 </p:sld>
 </file>
 
-<file path=ppt/slides/slide17.xml><?xml version="1.0" encoding="utf-8"?>
+<file path=ppt/slides/slide19.xml><?xml version="1.0" encoding="utf-8"?>
 <p:sld xmlns:a="http://schemas.openxmlformats.org/drawingml/2006/main" xmlns:r="http://schemas.openxmlformats.org/officeDocument/2006/relationships" xmlns:p="http://schemas.openxmlformats.org/presentationml/2006/main">
   <p:cSld>
     <p:spTree>
@@ -5809,341 +6052,6 @@
             <a:r>
               <a:rPr/>
               <a:t>vector.</a:t>
-            </a:r>
-          </a:p>
-        </p:txBody>
-      </p:sp>
-    </p:spTree>
-  </p:cSld>
-</p:sld>
-</file>
-
-<file path=ppt/slides/slide18.xml><?xml version="1.0" encoding="utf-8"?>
-<p:sld xmlns:a="http://schemas.openxmlformats.org/drawingml/2006/main" xmlns:r="http://schemas.openxmlformats.org/officeDocument/2006/relationships" xmlns:p="http://schemas.openxmlformats.org/presentationml/2006/main">
-  <p:cSld>
-    <p:spTree>
-      <p:nvGrpSpPr>
-        <p:cNvPr id="1" name=""/>
-        <p:cNvGrpSpPr/>
-        <p:nvPr/>
-      </p:nvGrpSpPr>
-      <p:grpSpPr>
-        <a:xfrm>
-          <a:off x="0" y="0"/>
-          <a:ext cx="0" cy="0"/>
-          <a:chOff x="0" y="0"/>
-          <a:chExt cx="0" cy="0"/>
-        </a:xfrm>
-      </p:grpSpPr>
-      <p:sp>
-        <p:nvSpPr>
-          <p:cNvPr id="2" name="Title 1">
-            <a:extLst>
-              <a:ext uri="{FF2B5EF4-FFF2-40B4-BE49-F238E27FC236}">
-                <a16:creationId xmlns:a16="http://schemas.microsoft.com/office/drawing/2014/main" id="{0CF11FE2-61CD-2E40-A43A-EED9A845FF8A}"/>
-              </a:ext>
-            </a:extLst>
-          </p:cNvPr>
-          <p:cNvSpPr>
-            <a:spLocks noGrp="1"/>
-          </p:cNvSpPr>
-          <p:nvPr>
-            <p:ph type="title"/>
-          </p:nvPr>
-        </p:nvSpPr>
-        <p:spPr/>
-        <p:txBody>
-          <a:bodyPr/>
-          <a:lstStyle/>
-          <a:p>
-            <a:pPr lvl="0" marL="0" indent="0">
-              <a:buNone/>
-            </a:pPr>
-            <a:r>
-              <a:rPr/>
-              <a:t>Viewing</a:t>
-            </a:r>
-            <a:r>
-              <a:rPr/>
-              <a:t> </a:t>
-            </a:r>
-            <a:r>
-              <a:rPr/>
-              <a:t>your</a:t>
-            </a:r>
-            <a:r>
-              <a:rPr/>
-              <a:t> </a:t>
-            </a:r>
-            <a:r>
-              <a:rPr/>
-              <a:t>data</a:t>
-            </a:r>
-            <a:r>
-              <a:rPr/>
-              <a:t> </a:t>
-            </a:r>
-            <a:r>
-              <a:rPr/>
-              <a:t>in</a:t>
-            </a:r>
-            <a:r>
-              <a:rPr/>
-              <a:t> </a:t>
-            </a:r>
-            <a:r>
-              <a:rPr/>
-              <a:t>R</a:t>
-            </a:r>
-          </a:p>
-        </p:txBody>
-      </p:sp>
-      <p:sp>
-        <p:nvSpPr>
-          <p:cNvPr id="3" name="Content Placeholder 2">
-            <a:extLst>
-              <a:ext uri="{FF2B5EF4-FFF2-40B4-BE49-F238E27FC236}">
-                <a16:creationId xmlns:a16="http://schemas.microsoft.com/office/drawing/2014/main" id="{C1CB83AA-6B3D-8243-8929-B2C82ECF02B5}"/>
-              </a:ext>
-            </a:extLst>
-          </p:cNvPr>
-          <p:cNvSpPr>
-            <a:spLocks noGrp="1"/>
-          </p:cNvSpPr>
-          <p:nvPr>
-            <p:ph sz="half" idx="1"/>
-          </p:nvPr>
-        </p:nvSpPr>
-        <p:spPr/>
-        <p:txBody>
-          <a:bodyPr/>
-          <a:lstStyle/>
-          <a:p>
-            <a:pPr lvl="1"/>
-            <a:r>
-              <a:rPr/>
-              <a:t>You have imported your data into R.</a:t>
-            </a:r>
-          </a:p>
-          <a:p>
-            <a:pPr lvl="1"/>
-            <a:r>
-              <a:rPr/>
-              <a:t>You need a neat way of looking at it.</a:t>
-            </a:r>
-          </a:p>
-          <a:p>
-            <a:pPr lvl="0" marL="1270000" indent="0">
-              <a:buNone/>
-            </a:pPr>
-            <a:r>
-              <a:rPr sz="1800" b="1">
-                <a:solidFill>
-                  <a:srgbClr val="007020"/>
-                </a:solidFill>
-                <a:latin typeface="Courier"/>
-              </a:rPr>
-              <a:t>View</a:t>
-            </a:r>
-            <a:r>
-              <a:rPr sz="1800">
-                <a:latin typeface="Courier"/>
-              </a:rPr>
-              <a:t>(cchic)</a:t>
-            </a:r>
-          </a:p>
-          <a:p>
-            <a:pPr lvl="1"/>
-            <a:r>
-              <a:rPr/>
-              <a:t>The data is displayed in a familiar spreadsheet format.</a:t>
-            </a:r>
-          </a:p>
-          <a:p>
-            <a:pPr lvl="2"/>
-            <a:r>
-              <a:rPr/>
-              <a:t>This is a more human-legible table.</a:t>
-            </a:r>
-            <a:br/>
-          </a:p>
-          <a:p>
-            <a:pPr lvl="2"/>
-            <a:r>
-              <a:rPr/>
-              <a:t>You can also view the data via the environment pane.</a:t>
-            </a:r>
-          </a:p>
-        </p:txBody>
-      </p:sp>
-      <p:pic>
-        <p:nvPicPr>
-          <p:cNvPr descr="../Images/View(cchic).png" id="0" name="Picture 1"/>
-          <p:cNvPicPr>
-            <a:picLocks noGrp="1" noChangeAspect="1"/>
-          </p:cNvPicPr>
-          <p:nvPr/>
-        </p:nvPicPr>
-        <p:blipFill>
-          <a:blip r:embed="rId2"/>
-          <a:stretch>
-            <a:fillRect/>
-          </a:stretch>
-        </p:blipFill>
-        <p:spPr bwMode="auto">
-          <a:xfrm>
-            <a:off x="6172200" y="2514600"/>
-            <a:ext cx="5181600" cy="2959100"/>
-          </a:xfrm>
-          <a:prstGeom prst="rect">
-            <a:avLst/>
-          </a:prstGeom>
-          <a:noFill/>
-          <a:ln w="9525">
-            <a:noFill/>
-            <a:headEnd/>
-            <a:tailEnd/>
-          </a:ln>
-        </p:spPr>
-      </p:pic>
-    </p:spTree>
-  </p:cSld>
-</p:sld>
-</file>
-
-<file path=ppt/slides/slide19.xml><?xml version="1.0" encoding="utf-8"?>
-<p:sld xmlns:a="http://schemas.openxmlformats.org/drawingml/2006/main" xmlns:r="http://schemas.openxmlformats.org/officeDocument/2006/relationships" xmlns:p="http://schemas.openxmlformats.org/presentationml/2006/main">
-  <p:cSld>
-    <p:spTree>
-      <p:nvGrpSpPr>
-        <p:cNvPr id="1" name=""/>
-        <p:cNvGrpSpPr/>
-        <p:nvPr/>
-      </p:nvGrpSpPr>
-      <p:grpSpPr>
-        <a:xfrm>
-          <a:off x="0" y="0"/>
-          <a:ext cx="0" cy="0"/>
-          <a:chOff x="0" y="0"/>
-          <a:chExt cx="0" cy="0"/>
-        </a:xfrm>
-      </p:grpSpPr>
-      <p:sp>
-        <p:nvSpPr>
-          <p:cNvPr id="2" name="Title 1">
-            <a:extLst>
-              <a:ext uri="{FF2B5EF4-FFF2-40B4-BE49-F238E27FC236}">
-                <a16:creationId xmlns:a16="http://schemas.microsoft.com/office/drawing/2014/main" id="{5567D468-EE70-CD4E-A3AC-039CC11EF1FB}"/>
-              </a:ext>
-            </a:extLst>
-          </p:cNvPr>
-          <p:cNvSpPr>
-            <a:spLocks noGrp="1"/>
-          </p:cNvSpPr>
-          <p:nvPr>
-            <p:ph type="title"/>
-          </p:nvPr>
-        </p:nvSpPr>
-        <p:spPr/>
-        <p:txBody>
-          <a:bodyPr/>
-          <a:lstStyle/>
-          <a:p>
-            <a:pPr lvl="0" marL="0" indent="0">
-              <a:buNone/>
-            </a:pPr>
-            <a:r>
-              <a:rPr/>
-              <a:t>Shortcuts</a:t>
-            </a:r>
-          </a:p>
-        </p:txBody>
-      </p:sp>
-      <p:sp>
-        <p:nvSpPr>
-          <p:cNvPr id="3" name="Content Placeholder 2">
-            <a:extLst>
-              <a:ext uri="{FF2B5EF4-FFF2-40B4-BE49-F238E27FC236}">
-                <a16:creationId xmlns:a16="http://schemas.microsoft.com/office/drawing/2014/main" id="{D10DDA37-E46B-B641-BC9F-636CB92A2C08}"/>
-              </a:ext>
-            </a:extLst>
-          </p:cNvPr>
-          <p:cNvSpPr>
-            <a:spLocks noGrp="1"/>
-          </p:cNvSpPr>
-          <p:nvPr>
-            <p:ph idx="1"/>
-          </p:nvPr>
-        </p:nvSpPr>
-        <p:spPr/>
-        <p:txBody>
-          <a:bodyPr/>
-          <a:lstStyle/>
-          <a:p>
-            <a:pPr lvl="1"/>
-            <a:r>
-              <a:rPr/>
-              <a:t>There are notations to shorten the code for the file path.</a:t>
-            </a:r>
-            <a:br/>
-          </a:p>
-          <a:p>
-            <a:pPr lvl="1"/>
-            <a:r>
-              <a:rPr/>
-              <a:t>Use single dot for a file within current working directory.</a:t>
-            </a:r>
-          </a:p>
-          <a:p>
-            <a:pPr lvl="1"/>
-            <a:r>
-              <a:rPr/>
-              <a:t>Use double dot </a:t>
-            </a:r>
-            <a:r>
-              <a:rPr sz="1800">
-                <a:latin typeface="Courier"/>
-              </a:rPr>
-              <a:t>..</a:t>
-            </a:r>
-            <a:r>
-              <a:rPr/>
-              <a:t> for a file in the directory above the current working directory.</a:t>
-            </a:r>
-          </a:p>
-          <a:p>
-            <a:pPr lvl="0" marL="1270000" indent="0">
-              <a:buNone/>
-            </a:pPr>
-            <a:r>
-              <a:rPr sz="1800" b="1">
-                <a:solidFill>
-                  <a:srgbClr val="007020"/>
-                </a:solidFill>
-                <a:latin typeface="Courier"/>
-              </a:rPr>
-              <a:t>read_csv</a:t>
-            </a:r>
-            <a:r>
-              <a:rPr sz="1800">
-                <a:latin typeface="Courier"/>
-              </a:rPr>
-              <a:t>(</a:t>
-            </a:r>
-            <a:r>
-              <a:rPr sz="1800">
-                <a:solidFill>
-                  <a:srgbClr val="4070A0"/>
-                </a:solidFill>
-                <a:latin typeface="Courier"/>
-              </a:rPr>
-              <a:t>"../clean_CCHIC.csv"</a:t>
-            </a:r>
-            <a:r>
-              <a:rPr sz="1800">
-                <a:latin typeface="Courier"/>
-              </a:rPr>
-              <a:t>)</a:t>
             </a:r>
           </a:p>
         </p:txBody>
@@ -6227,7 +6135,7 @@
           <p:cNvPr id="2" name="Title 1">
             <a:extLst>
               <a:ext uri="{FF2B5EF4-FFF2-40B4-BE49-F238E27FC236}">
-                <a16:creationId xmlns:a16="http://schemas.microsoft.com/office/drawing/2014/main" id="{5567D468-EE70-CD4E-A3AC-039CC11EF1FB}"/>
+                <a16:creationId xmlns:a16="http://schemas.microsoft.com/office/drawing/2014/main" id="{0CF11FE2-61CD-2E40-A43A-EED9A845FF8A}"/>
               </a:ext>
             </a:extLst>
           </p:cNvPr>
@@ -6248,7 +6156,7 @@
             </a:pPr>
             <a:r>
               <a:rPr/>
-              <a:t>Reviewing</a:t>
+              <a:t>Viewing</a:t>
             </a:r>
             <a:r>
               <a:rPr/>
@@ -6290,80 +6198,109 @@
           <p:cNvPr id="3" name="Content Placeholder 2">
             <a:extLst>
               <a:ext uri="{FF2B5EF4-FFF2-40B4-BE49-F238E27FC236}">
-                <a16:creationId xmlns:a16="http://schemas.microsoft.com/office/drawing/2014/main" id="{D10DDA37-E46B-B641-BC9F-636CB92A2C08}"/>
-              </a:ext>
-            </a:extLst>
-          </p:cNvPr>
-          <p:cNvSpPr>
-            <a:spLocks noGrp="1"/>
-          </p:cNvSpPr>
-          <p:nvPr>
-            <p:ph idx="1"/>
-          </p:nvPr>
-        </p:nvSpPr>
-        <p:spPr/>
-        <p:txBody>
-          <a:bodyPr/>
-          <a:lstStyle/>
-          <a:p>
-            <a:pPr lvl="0" marL="0" indent="0">
+                <a16:creationId xmlns:a16="http://schemas.microsoft.com/office/drawing/2014/main" id="{C1CB83AA-6B3D-8243-8929-B2C82ECF02B5}"/>
+              </a:ext>
+            </a:extLst>
+          </p:cNvPr>
+          <p:cNvSpPr>
+            <a:spLocks noGrp="1"/>
+          </p:cNvSpPr>
+          <p:nvPr>
+            <p:ph sz="half" idx="1"/>
+          </p:nvPr>
+        </p:nvSpPr>
+        <p:spPr/>
+        <p:txBody>
+          <a:bodyPr/>
+          <a:lstStyle/>
+          <a:p>
+            <a:pPr lvl="1"/>
+            <a:r>
+              <a:rPr/>
+              <a:t>You have imported your data into R.</a:t>
+            </a:r>
+          </a:p>
+          <a:p>
+            <a:pPr lvl="1"/>
+            <a:r>
+              <a:rPr/>
+              <a:t>You need a neat way of looking at it.</a:t>
+            </a:r>
+          </a:p>
+          <a:p>
+            <a:pPr lvl="0" marL="1270000" indent="0">
               <a:buNone/>
             </a:pPr>
             <a:r>
-              <a:rPr/>
-              <a:t>Spreadsheets in R are called data frames You can use these functions to investigate your data frame:</a:t>
+              <a:rPr sz="1800" b="1">
+                <a:solidFill>
+                  <a:srgbClr val="007020"/>
+                </a:solidFill>
+                <a:latin typeface="Courier"/>
+              </a:rPr>
+              <a:t>View</a:t>
+            </a:r>
+            <a:r>
+              <a:rPr sz="1800">
+                <a:latin typeface="Courier"/>
+              </a:rPr>
+              <a:t>(cchic)</a:t>
             </a:r>
           </a:p>
           <a:p>
             <a:pPr lvl="1"/>
             <a:r>
-              <a:rPr sz="1800">
-                <a:latin typeface="Courier"/>
-              </a:rPr>
-              <a:t>head(cchic)</a:t>
+              <a:rPr/>
+              <a:t>The data is displayed in a familiar spreadsheet format.</a:t>
+            </a:r>
+          </a:p>
+          <a:p>
+            <a:pPr lvl="2"/>
+            <a:r>
+              <a:rPr/>
+              <a:t>This is a more human-legible table.</a:t>
             </a:r>
             <a:br/>
           </a:p>
           <a:p>
-            <a:pPr lvl="1"/>
-            <a:r>
-              <a:rPr sz="1800">
-                <a:latin typeface="Courier"/>
-              </a:rPr>
-              <a:t>tail(cchic)</a:t>
-            </a:r>
-            <a:br/>
-          </a:p>
-          <a:p>
-            <a:pPr lvl="1"/>
-            <a:r>
-              <a:rPr sz="1800">
-                <a:latin typeface="Courier"/>
-              </a:rPr>
-              <a:t>names(cchic)</a:t>
-            </a:r>
-            <a:br/>
-          </a:p>
-          <a:p>
-            <a:pPr lvl="1"/>
-            <a:r>
-              <a:rPr sz="1800">
-                <a:latin typeface="Courier"/>
-              </a:rPr>
-              <a:t>class(cchic)</a:t>
-            </a:r>
-          </a:p>
-          <a:p>
-            <a:pPr lvl="1"/>
-            <a:r>
-              <a:rPr sz="1800">
-                <a:latin typeface="Courier"/>
-              </a:rPr>
-              <a:t>str(cchic)</a:t>
-            </a:r>
-          </a:p>
-        </p:txBody>
-      </p:sp>
+            <a:pPr lvl="2"/>
+            <a:r>
+              <a:rPr/>
+              <a:t>You can also view the data via the environment pane.</a:t>
+            </a:r>
+          </a:p>
+        </p:txBody>
+      </p:sp>
+      <p:pic>
+        <p:nvPicPr>
+          <p:cNvPr descr="../Images/View(cchic).png" id="0" name="Picture 1"/>
+          <p:cNvPicPr>
+            <a:picLocks noGrp="1" noChangeAspect="1"/>
+          </p:cNvPicPr>
+          <p:nvPr/>
+        </p:nvPicPr>
+        <p:blipFill>
+          <a:blip r:embed="rId2"/>
+          <a:stretch>
+            <a:fillRect/>
+          </a:stretch>
+        </p:blipFill>
+        <p:spPr bwMode="auto">
+          <a:xfrm>
+            <a:off x="6172200" y="2514600"/>
+            <a:ext cx="5181600" cy="2959100"/>
+          </a:xfrm>
+          <a:prstGeom prst="rect">
+            <a:avLst/>
+          </a:prstGeom>
+          <a:noFill/>
+          <a:ln w="9525">
+            <a:noFill/>
+            <a:headEnd/>
+            <a:tailEnd/>
+          </a:ln>
+        </p:spPr>
+      </p:pic>
     </p:spTree>
   </p:cSld>
 </p:sld>
@@ -6412,7 +6349,7 @@
             </a:pPr>
             <a:r>
               <a:rPr/>
-              <a:t>head()</a:t>
+              <a:t>Shortcuts</a:t>
             </a:r>
           </a:p>
         </p:txBody>
@@ -6437,6 +6374,38 @@
         <p:txBody>
           <a:bodyPr/>
           <a:lstStyle/>
+          <a:p>
+            <a:pPr lvl="1"/>
+            <a:r>
+              <a:rPr/>
+              <a:t>There are notations to shorten the code for the file path.</a:t>
+            </a:r>
+            <a:br/>
+          </a:p>
+          <a:p>
+            <a:pPr lvl="1"/>
+            <a:r>
+              <a:rPr/>
+              <a:t>Use single dot for a file within current working directory.</a:t>
+            </a:r>
+          </a:p>
+          <a:p>
+            <a:pPr lvl="1"/>
+            <a:r>
+              <a:rPr/>
+              <a:t>Use double dot </a:t>
+            </a:r>
+            <a:r>
+              <a:rPr sz="1800">
+                <a:latin typeface="Courier"/>
+              </a:rPr>
+              <a:t>..</a:t>
+            </a:r>
+            <a:r>
+              <a:rPr/>
+              <a:t> for a file in the directory above the current working directory.</a:t>
+            </a:r>
+          </a:p>
           <a:p>
             <a:pPr lvl="0" marL="1270000" indent="0">
               <a:buNone/>
@@ -6448,22 +6417,28 @@
                 </a:solidFill>
                 <a:latin typeface="Courier"/>
               </a:rPr>
-              <a:t>head</a:t>
+              <a:t>read_csv</a:t>
             </a:r>
             <a:r>
               <a:rPr sz="1800">
                 <a:latin typeface="Courier"/>
               </a:rPr>
-              <a:t>(cchic)</a:t>
-            </a:r>
-          </a:p>
-          <a:p>
-            <a:pPr lvl="0" marL="0" indent="0">
-              <a:buNone/>
-            </a:pPr>
-            <a:r>
-              <a:rPr/>
-              <a:t>Prints the first 6 rows of the data frame.</a:t>
+              <a:t>(</a:t>
+            </a:r>
+            <a:r>
+              <a:rPr sz="1800">
+                <a:solidFill>
+                  <a:srgbClr val="4070A0"/>
+                </a:solidFill>
+                <a:latin typeface="Courier"/>
+              </a:rPr>
+              <a:t>"../clean_CCHIC.csv"</a:t>
+            </a:r>
+            <a:r>
+              <a:rPr sz="1800">
+                <a:latin typeface="Courier"/>
+              </a:rPr>
+              <a:t>)</a:t>
             </a:r>
           </a:p>
         </p:txBody>
@@ -6516,7 +6491,39 @@
             </a:pPr>
             <a:r>
               <a:rPr/>
-              <a:t>tail()</a:t>
+              <a:t>Reviewing</a:t>
+            </a:r>
+            <a:r>
+              <a:rPr/>
+              <a:t> </a:t>
+            </a:r>
+            <a:r>
+              <a:rPr/>
+              <a:t>your</a:t>
+            </a:r>
+            <a:r>
+              <a:rPr/>
+              <a:t> </a:t>
+            </a:r>
+            <a:r>
+              <a:rPr/>
+              <a:t>data</a:t>
+            </a:r>
+            <a:r>
+              <a:rPr/>
+              <a:t> </a:t>
+            </a:r>
+            <a:r>
+              <a:rPr/>
+              <a:t>in</a:t>
+            </a:r>
+            <a:r>
+              <a:rPr/>
+              <a:t> </a:t>
+            </a:r>
+            <a:r>
+              <a:rPr/>
+              <a:t>R</a:t>
             </a:r>
           </a:p>
         </p:txBody>
@@ -6542,32 +6549,60 @@
           <a:bodyPr/>
           <a:lstStyle/>
           <a:p>
-            <a:pPr lvl="0" marL="1270000" indent="0">
+            <a:pPr lvl="0" marL="0" indent="0">
               <a:buNone/>
             </a:pPr>
             <a:r>
-              <a:rPr sz="1800" b="1">
-                <a:solidFill>
-                  <a:srgbClr val="007020"/>
-                </a:solidFill>
-                <a:latin typeface="Courier"/>
-              </a:rPr>
-              <a:t>tail</a:t>
-            </a:r>
+              <a:rPr/>
+              <a:t>Spreadsheets in R are called data frames You can use these functions to investigate your data frame:</a:t>
+            </a:r>
+          </a:p>
+          <a:p>
+            <a:pPr lvl="1"/>
             <a:r>
               <a:rPr sz="1800">
                 <a:latin typeface="Courier"/>
               </a:rPr>
-              <a:t>(cchic)</a:t>
-            </a:r>
-          </a:p>
-          <a:p>
-            <a:pPr lvl="0" marL="0" indent="0">
-              <a:buNone/>
-            </a:pPr>
-            <a:r>
-              <a:rPr/>
-              <a:t>Prints the last 6 rows of the data frame.</a:t>
+              <a:t>head(cchic)</a:t>
+            </a:r>
+            <a:br/>
+          </a:p>
+          <a:p>
+            <a:pPr lvl="1"/>
+            <a:r>
+              <a:rPr sz="1800">
+                <a:latin typeface="Courier"/>
+              </a:rPr>
+              <a:t>tail(cchic)</a:t>
+            </a:r>
+            <a:br/>
+          </a:p>
+          <a:p>
+            <a:pPr lvl="1"/>
+            <a:r>
+              <a:rPr sz="1800">
+                <a:latin typeface="Courier"/>
+              </a:rPr>
+              <a:t>names(cchic)</a:t>
+            </a:r>
+            <a:br/>
+          </a:p>
+          <a:p>
+            <a:pPr lvl="1"/>
+            <a:r>
+              <a:rPr sz="1800">
+                <a:latin typeface="Courier"/>
+              </a:rPr>
+              <a:t>class(cchic)</a:t>
+            </a:r>
+          </a:p>
+          <a:p>
+            <a:pPr lvl="1"/>
+            <a:r>
+              <a:rPr sz="1800">
+                <a:latin typeface="Courier"/>
+              </a:rPr>
+              <a:t>str(cchic)</a:t>
             </a:r>
           </a:p>
         </p:txBody>
@@ -6620,7 +6655,7 @@
             </a:pPr>
             <a:r>
               <a:rPr/>
-              <a:t>names()</a:t>
+              <a:t>head()</a:t>
             </a:r>
           </a:p>
         </p:txBody>
@@ -6656,7 +6691,7 @@
                 </a:solidFill>
                 <a:latin typeface="Courier"/>
               </a:rPr>
-              <a:t>names</a:t>
+              <a:t>head</a:t>
             </a:r>
             <a:r>
               <a:rPr sz="1800">
@@ -6671,7 +6706,7 @@
             </a:pPr>
             <a:r>
               <a:rPr/>
-              <a:t>Prints the names of the variables.</a:t>
+              <a:t>Prints the first 6 rows of the data frame.</a:t>
             </a:r>
           </a:p>
         </p:txBody>
@@ -6724,7 +6759,7 @@
             </a:pPr>
             <a:r>
               <a:rPr/>
-              <a:t>class()</a:t>
+              <a:t>tail()</a:t>
             </a:r>
           </a:p>
         </p:txBody>
@@ -6760,7 +6795,7 @@
                 </a:solidFill>
                 <a:latin typeface="Courier"/>
               </a:rPr>
-              <a:t>class</a:t>
+              <a:t>tail</a:t>
             </a:r>
             <a:r>
               <a:rPr sz="1800">
@@ -6775,17 +6810,7 @@
             </a:pPr>
             <a:r>
               <a:rPr/>
-              <a:t>Prints the class of the object </a:t>
-            </a:r>
-            <a:r>
-              <a:rPr sz="1800">
-                <a:latin typeface="Courier"/>
-              </a:rPr>
-              <a:t>cchic</a:t>
-            </a:r>
-            <a:r>
-              <a:rPr/>
-              <a:t>.</a:t>
+              <a:t>Prints the last 6 rows of the data frame.</a:t>
             </a:r>
           </a:p>
         </p:txBody>
@@ -6838,7 +6863,7 @@
             </a:pPr>
             <a:r>
               <a:rPr/>
-              <a:t>str()</a:t>
+              <a:t>names()</a:t>
             </a:r>
           </a:p>
         </p:txBody>
@@ -6874,7 +6899,7 @@
                 </a:solidFill>
                 <a:latin typeface="Courier"/>
               </a:rPr>
-              <a:t>str</a:t>
+              <a:t>names</a:t>
             </a:r>
             <a:r>
               <a:rPr sz="1800">
@@ -6889,17 +6914,7 @@
             </a:pPr>
             <a:r>
               <a:rPr/>
-              <a:t>Prints the data type of each variable in </a:t>
-            </a:r>
-            <a:r>
-              <a:rPr sz="1800">
-                <a:latin typeface="Courier"/>
-              </a:rPr>
-              <a:t>cchic</a:t>
-            </a:r>
-            <a:r>
-              <a:rPr/>
-              <a:t>.</a:t>
+              <a:t>Prints the names of the variables.</a:t>
             </a:r>
           </a:p>
         </p:txBody>
@@ -6952,31 +6967,7 @@
             </a:pPr>
             <a:r>
               <a:rPr/>
-              <a:t>Look</a:t>
-            </a:r>
-            <a:r>
-              <a:rPr/>
-              <a:t> </a:t>
-            </a:r>
-            <a:r>
-              <a:rPr/>
-              <a:t>at</a:t>
-            </a:r>
-            <a:r>
-              <a:rPr/>
-              <a:t> </a:t>
-            </a:r>
-            <a:r>
-              <a:rPr/>
-              <a:t>specific</a:t>
-            </a:r>
-            <a:r>
-              <a:rPr/>
-              <a:t> </a:t>
-            </a:r>
-            <a:r>
-              <a:rPr/>
-              <a:t>items</a:t>
+              <a:t>class()</a:t>
             </a:r>
           </a:p>
         </p:txBody>
@@ -7002,76 +6993,42 @@
           <a:bodyPr/>
           <a:lstStyle/>
           <a:p>
+            <a:pPr lvl="0" marL="1270000" indent="0">
+              <a:buNone/>
+            </a:pPr>
+            <a:r>
+              <a:rPr sz="1800" b="1">
+                <a:solidFill>
+                  <a:srgbClr val="007020"/>
+                </a:solidFill>
+                <a:latin typeface="Courier"/>
+              </a:rPr>
+              <a:t>class</a:t>
+            </a:r>
+            <a:r>
+              <a:rPr sz="1800">
+                <a:latin typeface="Courier"/>
+              </a:rPr>
+              <a:t>(cchic)</a:t>
+            </a:r>
+          </a:p>
+          <a:p>
             <a:pPr lvl="0" marL="0" indent="0">
               <a:buNone/>
             </a:pPr>
             <a:r>
               <a:rPr/>
-              <a:t>You can look at specific data points.</a:t>
-            </a:r>
-          </a:p>
-          <a:p>
-            <a:pPr lvl="0" marL="1270000" indent="0">
-              <a:buNone/>
-            </a:pPr>
+              <a:t>Prints the class of the object </a:t>
+            </a:r>
             <a:r>
               <a:rPr sz="1800">
                 <a:latin typeface="Courier"/>
               </a:rPr>
-              <a:t>cchic[</a:t>
-            </a:r>
-            <a:r>
-              <a:rPr sz="1800">
-                <a:solidFill>
-                  <a:srgbClr val="40A070"/>
-                </a:solidFill>
-                <a:latin typeface="Courier"/>
-              </a:rPr>
-              <a:t>21</a:t>
-            </a:r>
-            <a:r>
-              <a:rPr sz="1800">
-                <a:latin typeface="Courier"/>
-              </a:rPr>
-              <a:t>, </a:t>
-            </a:r>
-            <a:r>
-              <a:rPr sz="1800">
-                <a:solidFill>
-                  <a:srgbClr val="40A070"/>
-                </a:solidFill>
-                <a:latin typeface="Courier"/>
-              </a:rPr>
-              <a:t>5</a:t>
-            </a:r>
-            <a:r>
-              <a:rPr sz="1800">
-                <a:latin typeface="Courier"/>
-              </a:rPr>
-              <a:t>]</a:t>
-            </a:r>
-          </a:p>
-          <a:p>
-            <a:pPr lvl="0" marL="1270000" indent="0">
-              <a:buNone/>
-            </a:pPr>
-            <a:r>
-              <a:rPr sz="1800">
-                <a:latin typeface="Courier"/>
-              </a:rPr>
-              <a:t>## # A tibble: 1 x 1
-##   temp_nc
-##     &lt;dbl&gt;
-## 1    36.1</a:t>
-            </a:r>
-          </a:p>
-          <a:p>
-            <a:pPr lvl="0" marL="0" indent="0">
-              <a:buNone/>
-            </a:pPr>
-            <a:r>
-              <a:rPr/>
-              <a:t>This displays the the piece of data in the 21st row and 5th column.</a:t>
+              <a:t>cchic</a:t>
+            </a:r>
+            <a:r>
+              <a:rPr/>
+              <a:t>.</a:t>
             </a:r>
           </a:p>
         </p:txBody>
@@ -7124,39 +7081,7 @@
             </a:pPr>
             <a:r>
               <a:rPr/>
-              <a:t>Selecting</a:t>
-            </a:r>
-            <a:r>
-              <a:rPr/>
-              <a:t> </a:t>
-            </a:r>
-            <a:r>
-              <a:rPr/>
-              <a:t>variables</a:t>
-            </a:r>
-            <a:r>
-              <a:rPr/>
-              <a:t> </a:t>
-            </a:r>
-            <a:r>
-              <a:rPr/>
-              <a:t>using</a:t>
-            </a:r>
-            <a:r>
-              <a:rPr/>
-              <a:t> </a:t>
-            </a:r>
-            <a:r>
-              <a:rPr/>
-              <a:t>$</a:t>
-            </a:r>
-            <a:r>
-              <a:rPr/>
-              <a:t> </a:t>
-            </a:r>
-            <a:r>
-              <a:rPr/>
-              <a:t>sign</a:t>
+              <a:t>str()</a:t>
             </a:r>
           </a:p>
         </p:txBody>
@@ -7182,66 +7107,42 @@
           <a:bodyPr/>
           <a:lstStyle/>
           <a:p>
-            <a:pPr lvl="1"/>
-            <a:r>
-              <a:rPr/>
-              <a:t>You can also use the </a:t>
+            <a:pPr lvl="0" marL="1270000" indent="0">
+              <a:buNone/>
+            </a:pPr>
+            <a:r>
+              <a:rPr sz="1800" b="1">
+                <a:solidFill>
+                  <a:srgbClr val="007020"/>
+                </a:solidFill>
+                <a:latin typeface="Courier"/>
+              </a:rPr>
+              <a:t>str</a:t>
             </a:r>
             <a:r>
               <a:rPr sz="1800">
                 <a:latin typeface="Courier"/>
               </a:rPr>
-              <a:t>$</a:t>
-            </a:r>
-            <a:r>
-              <a:rPr/>
-              <a:t> function.</a:t>
-            </a:r>
-          </a:p>
-          <a:p>
-            <a:pPr lvl="1"/>
-            <a:r>
-              <a:rPr/>
-              <a:t>Enter </a:t>
+              <a:t>(cchic)</a:t>
+            </a:r>
+          </a:p>
+          <a:p>
+            <a:pPr lvl="0" marL="0" indent="0">
+              <a:buNone/>
+            </a:pPr>
+            <a:r>
+              <a:rPr/>
+              <a:t>Prints the data type of each variable in </a:t>
             </a:r>
             <a:r>
               <a:rPr sz="1800">
                 <a:latin typeface="Courier"/>
               </a:rPr>
-              <a:t>data_frame_name$variable_name</a:t>
-            </a:r>
-          </a:p>
-          <a:p>
-            <a:pPr lvl="0" marL="1270000" indent="0">
-              <a:buNone/>
-            </a:pPr>
-            <a:r>
-              <a:rPr sz="1800">
-                <a:latin typeface="Courier"/>
-              </a:rPr>
               <a:t>cchic</a:t>
             </a:r>
             <a:r>
-              <a:rPr sz="1800">
-                <a:solidFill>
-                  <a:srgbClr val="666666"/>
-                </a:solidFill>
-                <a:latin typeface="Courier"/>
-              </a:rPr>
-              <a:t>$</a:t>
-            </a:r>
-            <a:r>
-              <a:rPr sz="1800">
-                <a:latin typeface="Courier"/>
-              </a:rPr>
-              <a:t>weight</a:t>
-            </a:r>
-          </a:p>
-          <a:p>
-            <a:pPr lvl="1"/>
-            <a:r>
-              <a:rPr/>
-              <a:t>This will list all of the data in the weight column.</a:t>
+              <a:rPr/>
+              <a:t>.</a:t>
             </a:r>
           </a:p>
         </p:txBody>
@@ -7294,39 +7195,31 @@
             </a:pPr>
             <a:r>
               <a:rPr/>
-              <a:t>Other</a:t>
-            </a:r>
-            <a:r>
-              <a:rPr/>
-              <a:t> </a:t>
-            </a:r>
-            <a:r>
-              <a:rPr/>
-              <a:t>tools</a:t>
-            </a:r>
-            <a:r>
-              <a:rPr/>
-              <a:t> </a:t>
-            </a:r>
-            <a:r>
-              <a:rPr/>
-              <a:t>to</a:t>
-            </a:r>
-            <a:r>
-              <a:rPr/>
-              <a:t> </a:t>
-            </a:r>
-            <a:r>
-              <a:rPr/>
-              <a:t>review</a:t>
-            </a:r>
-            <a:r>
-              <a:rPr/>
-              <a:t> </a:t>
-            </a:r>
-            <a:r>
-              <a:rPr/>
-              <a:t>data</a:t>
+              <a:t>Look</a:t>
+            </a:r>
+            <a:r>
+              <a:rPr/>
+              <a:t> </a:t>
+            </a:r>
+            <a:r>
+              <a:rPr/>
+              <a:t>at</a:t>
+            </a:r>
+            <a:r>
+              <a:rPr/>
+              <a:t> </a:t>
+            </a:r>
+            <a:r>
+              <a:rPr/>
+              <a:t>specific</a:t>
+            </a:r>
+            <a:r>
+              <a:rPr/>
+              <a:t> </a:t>
+            </a:r>
+            <a:r>
+              <a:rPr/>
+              <a:t>items</a:t>
             </a:r>
           </a:p>
         </p:txBody>
@@ -7352,78 +7245,76 @@
           <a:bodyPr/>
           <a:lstStyle/>
           <a:p>
-            <a:pPr lvl="1"/>
-            <a:r>
-              <a:rPr/>
-              <a:t>Specific functions from special packages help you describe the whole data set.</a:t>
-            </a:r>
-          </a:p>
-          <a:p>
-            <a:pPr lvl="1"/>
-            <a:r>
-              <a:rPr/>
-              <a:t>The function will look at each variable and will give you basic measures about the data, for example range and mean.</a:t>
-            </a:r>
-          </a:p>
-          <a:p>
-            <a:pPr lvl="1"/>
-            <a:r>
-              <a:rPr/>
-              <a:t>The data will also be described in a number of plots.</a:t>
-            </a:r>
-          </a:p>
-          <a:p>
-            <a:pPr lvl="2"/>
+            <a:pPr lvl="0" marL="0" indent="0">
+              <a:buNone/>
+            </a:pPr>
+            <a:r>
+              <a:rPr/>
+              <a:t>You can look at specific data points.</a:t>
+            </a:r>
+          </a:p>
+          <a:p>
+            <a:pPr lvl="0" marL="1270000" indent="0">
+              <a:buNone/>
+            </a:pPr>
             <a:r>
               <a:rPr sz="1800">
                 <a:latin typeface="Courier"/>
               </a:rPr>
-              <a:t>Desc()</a:t>
-            </a:r>
-            <a:r>
-              <a:rPr/>
-              <a:t> from </a:t>
+              <a:t>cchic[</a:t>
             </a:r>
             <a:r>
               <a:rPr sz="1800">
-                <a:latin typeface="Courier"/>
-              </a:rPr>
-              <a:t>DescTools</a:t>
-            </a:r>
-            <a:r>
-              <a:rPr/>
-              <a:t> package</a:t>
-            </a:r>
-          </a:p>
-          <a:p>
-            <a:pPr lvl="2"/>
+                <a:solidFill>
+                  <a:srgbClr val="40A070"/>
+                </a:solidFill>
+                <a:latin typeface="Courier"/>
+              </a:rPr>
+              <a:t>21</a:t>
+            </a:r>
             <a:r>
               <a:rPr sz="1800">
                 <a:latin typeface="Courier"/>
               </a:rPr>
-              <a:t>describe()</a:t>
-            </a:r>
-            <a:r>
-              <a:rPr/>
-              <a:t> from </a:t>
+              <a:t>, </a:t>
             </a:r>
             <a:r>
               <a:rPr sz="1800">
-                <a:latin typeface="Courier"/>
-              </a:rPr>
-              <a:t>Hmisc</a:t>
-            </a:r>
-            <a:r>
-              <a:rPr/>
-              <a:t> package</a:t>
-            </a:r>
-            <a:br/>
-          </a:p>
-          <a:p>
-            <a:pPr lvl="1"/>
-            <a:r>
-              <a:rPr/>
-              <a:t>To use these you have to install the appropriate packages.</a:t>
+                <a:solidFill>
+                  <a:srgbClr val="40A070"/>
+                </a:solidFill>
+                <a:latin typeface="Courier"/>
+              </a:rPr>
+              <a:t>5</a:t>
+            </a:r>
+            <a:r>
+              <a:rPr sz="1800">
+                <a:latin typeface="Courier"/>
+              </a:rPr>
+              <a:t>]</a:t>
+            </a:r>
+          </a:p>
+          <a:p>
+            <a:pPr lvl="0" marL="1270000" indent="0">
+              <a:buNone/>
+            </a:pPr>
+            <a:r>
+              <a:rPr sz="1800">
+                <a:latin typeface="Courier"/>
+              </a:rPr>
+              <a:t>## # A tibble: 1 x 1
+##   temp_nc
+##     &lt;dbl&gt;
+## 1    36.1</a:t>
+            </a:r>
+          </a:p>
+          <a:p>
+            <a:pPr lvl="0" marL="0" indent="0">
+              <a:buNone/>
+            </a:pPr>
+            <a:r>
+              <a:rPr/>
+              <a:t>This displays the the piece of data in the 21st row and 5th column.</a:t>
             </a:r>
           </a:p>
         </p:txBody>
@@ -7476,7 +7367,39 @@
             </a:pPr>
             <a:r>
               <a:rPr/>
-              <a:t>Exercise</a:t>
+              <a:t>Selecting</a:t>
+            </a:r>
+            <a:r>
+              <a:rPr/>
+              <a:t> </a:t>
+            </a:r>
+            <a:r>
+              <a:rPr/>
+              <a:t>variables</a:t>
+            </a:r>
+            <a:r>
+              <a:rPr/>
+              <a:t> </a:t>
+            </a:r>
+            <a:r>
+              <a:rPr/>
+              <a:t>using</a:t>
+            </a:r>
+            <a:r>
+              <a:rPr/>
+              <a:t> </a:t>
+            </a:r>
+            <a:r>
+              <a:rPr/>
+              <a:t>$</a:t>
+            </a:r>
+            <a:r>
+              <a:rPr/>
+              <a:t> </a:t>
+            </a:r>
+            <a:r>
+              <a:rPr/>
+              <a:t>sign</a:t>
             </a:r>
           </a:p>
         </p:txBody>
@@ -7502,97 +7425,66 @@
           <a:bodyPr/>
           <a:lstStyle/>
           <a:p>
-            <a:pPr lvl="1">
-              <a:buAutoNum type="arabicPeriod"/>
+            <a:pPr lvl="1"/>
+            <a:r>
+              <a:rPr/>
+              <a:t>You can also use the </a:t>
+            </a:r>
+            <a:r>
+              <a:rPr sz="1800">
+                <a:latin typeface="Courier"/>
+              </a:rPr>
+              <a:t>$</a:t>
+            </a:r>
+            <a:r>
+              <a:rPr/>
+              <a:t> function.</a:t>
+            </a:r>
+          </a:p>
+          <a:p>
+            <a:pPr lvl="1"/>
+            <a:r>
+              <a:rPr/>
+              <a:t>Enter </a:t>
+            </a:r>
+            <a:r>
+              <a:rPr sz="1800">
+                <a:latin typeface="Courier"/>
+              </a:rPr>
+              <a:t>data_frame_name$variable_name</a:t>
+            </a:r>
+          </a:p>
+          <a:p>
+            <a:pPr lvl="0" marL="1270000" indent="0">
+              <a:buNone/>
             </a:pPr>
             <a:r>
-              <a:rPr/>
-              <a:t>What types of variables do you have in </a:t>
-            </a:r>
-            <a:r>
               <a:rPr sz="1800">
                 <a:latin typeface="Courier"/>
               </a:rPr>
               <a:t>cchic</a:t>
             </a:r>
             <a:r>
-              <a:rPr/>
-              <a:t>?</a:t>
-            </a:r>
-          </a:p>
-          <a:p>
-            <a:pPr lvl="1">
-              <a:buAutoNum type="arabicPeriod"/>
-            </a:pPr>
-            <a:r>
-              <a:rPr/>
-              <a:t>Display the </a:t>
-            </a:r>
-            <a:r>
               <a:rPr sz="1800">
-                <a:latin typeface="Courier"/>
-              </a:rPr>
-              <a:t>discharge_dttm</a:t>
-            </a:r>
-            <a:r>
-              <a:rPr/>
-              <a:t> vector from in </a:t>
+                <a:solidFill>
+                  <a:srgbClr val="666666"/>
+                </a:solidFill>
+                <a:latin typeface="Courier"/>
+              </a:rPr>
+              <a:t>$</a:t>
             </a:r>
             <a:r>
               <a:rPr sz="1800">
                 <a:latin typeface="Courier"/>
               </a:rPr>
-              <a:t>cchic</a:t>
-            </a:r>
-            <a:r>
-              <a:rPr/>
-              <a:t>.</a:t>
-            </a:r>
-          </a:p>
-          <a:p>
-            <a:pPr lvl="1">
-              <a:buAutoNum type="arabicPeriod"/>
-            </a:pPr>
-            <a:r>
-              <a:rPr/>
-              <a:t>How many men and women are in the database?</a:t>
-            </a:r>
-          </a:p>
-          <a:p>
-            <a:pPr lvl="1">
-              <a:buAutoNum type="arabicPeriod"/>
-            </a:pPr>
-            <a:r>
-              <a:rPr/>
-              <a:t>How many survived and how many died?</a:t>
-            </a:r>
-          </a:p>
-          <a:p>
-            <a:pPr lvl="2">
-              <a:buAutoNum type="alphaLcParenR"/>
-            </a:pPr>
-            <a:r>
-              <a:rPr/>
-              <a:t>What does the function </a:t>
-            </a:r>
-            <a:r>
-              <a:rPr sz="1800">
-                <a:latin typeface="Courier"/>
-              </a:rPr>
-              <a:t>ls()</a:t>
-            </a:r>
-            <a:r>
-              <a:rPr/>
-              <a:t> do?</a:t>
-            </a:r>
-          </a:p>
-          <a:p>
-            <a:pPr lvl="2">
-              <a:buAutoNum type="alphaLcParenR"/>
-            </a:pPr>
-            <a:r>
-              <a:rPr/>
-              <a:t>Use it to see how many vectors contain information about “temp”.</a:t>
+              <a:t>weight</a:t>
+            </a:r>
+          </a:p>
+          <a:p>
+            <a:pPr lvl="1"/>
+            <a:r>
+              <a:rPr/>
+              <a:t>This will list all of the data in the weight column.</a:t>
             </a:r>
           </a:p>
         </p:txBody>
@@ -7799,15 +7691,39 @@
             </a:pPr>
             <a:r>
               <a:rPr/>
-              <a:t>Answer</a:t>
-            </a:r>
-            <a:r>
-              <a:rPr/>
-              <a:t> </a:t>
-            </a:r>
-            <a:r>
-              <a:rPr/>
-              <a:t>1.</a:t>
+              <a:t>Other</a:t>
+            </a:r>
+            <a:r>
+              <a:rPr/>
+              <a:t> </a:t>
+            </a:r>
+            <a:r>
+              <a:rPr/>
+              <a:t>tools</a:t>
+            </a:r>
+            <a:r>
+              <a:rPr/>
+              <a:t> </a:t>
+            </a:r>
+            <a:r>
+              <a:rPr/>
+              <a:t>to</a:t>
+            </a:r>
+            <a:r>
+              <a:rPr/>
+              <a:t> </a:t>
+            </a:r>
+            <a:r>
+              <a:rPr/>
+              <a:t>review</a:t>
+            </a:r>
+            <a:r>
+              <a:rPr/>
+              <a:t> </a:t>
+            </a:r>
+            <a:r>
+              <a:rPr/>
+              <a:t>data</a:t>
             </a:r>
           </a:p>
         </p:txBody>
@@ -7833,42 +7749,78 @@
           <a:bodyPr/>
           <a:lstStyle/>
           <a:p>
-            <a:pPr lvl="0" marL="0" indent="0">
-              <a:buNone/>
-            </a:pPr>
-            <a:r>
-              <a:rPr/>
-              <a:t>What types of variables do you have in </a:t>
-            </a:r>
+            <a:pPr lvl="1"/>
+            <a:r>
+              <a:rPr/>
+              <a:t>Specific functions from special packages help you describe the whole data set.</a:t>
+            </a:r>
+          </a:p>
+          <a:p>
+            <a:pPr lvl="1"/>
+            <a:r>
+              <a:rPr/>
+              <a:t>The function will look at each variable and will give you basic measures about the data, for example range and mean.</a:t>
+            </a:r>
+          </a:p>
+          <a:p>
+            <a:pPr lvl="1"/>
+            <a:r>
+              <a:rPr/>
+              <a:t>The data will also be described in a number of plots.</a:t>
+            </a:r>
+          </a:p>
+          <a:p>
+            <a:pPr lvl="2"/>
             <a:r>
               <a:rPr sz="1800">
                 <a:latin typeface="Courier"/>
               </a:rPr>
-              <a:t>cchic</a:t>
-            </a:r>
-            <a:r>
-              <a:rPr/>
-              <a:t>?</a:t>
-            </a:r>
-          </a:p>
-          <a:p>
-            <a:pPr lvl="0" marL="1270000" indent="0">
-              <a:buNone/>
-            </a:pPr>
-            <a:r>
-              <a:rPr sz="1800" b="1">
-                <a:solidFill>
-                  <a:srgbClr val="007020"/>
-                </a:solidFill>
-                <a:latin typeface="Courier"/>
-              </a:rPr>
-              <a:t>str</a:t>
+              <a:t>Desc()</a:t>
+            </a:r>
+            <a:r>
+              <a:rPr/>
+              <a:t> from </a:t>
             </a:r>
             <a:r>
               <a:rPr sz="1800">
                 <a:latin typeface="Courier"/>
               </a:rPr>
-              <a:t>(cchic)</a:t>
+              <a:t>DescTools</a:t>
+            </a:r>
+            <a:r>
+              <a:rPr/>
+              <a:t> package</a:t>
+            </a:r>
+          </a:p>
+          <a:p>
+            <a:pPr lvl="2"/>
+            <a:r>
+              <a:rPr sz="1800">
+                <a:latin typeface="Courier"/>
+              </a:rPr>
+              <a:t>describe()</a:t>
+            </a:r>
+            <a:r>
+              <a:rPr/>
+              <a:t> from </a:t>
+            </a:r>
+            <a:r>
+              <a:rPr sz="1800">
+                <a:latin typeface="Courier"/>
+              </a:rPr>
+              <a:t>Hmisc</a:t>
+            </a:r>
+            <a:r>
+              <a:rPr/>
+              <a:t> package</a:t>
+            </a:r>
+            <a:br/>
+          </a:p>
+          <a:p>
+            <a:pPr lvl="1"/>
+            <a:r>
+              <a:rPr/>
+              <a:t>To use these you have to install the appropriate packages.</a:t>
             </a:r>
           </a:p>
         </p:txBody>
@@ -7921,15 +7873,7 @@
             </a:pPr>
             <a:r>
               <a:rPr/>
-              <a:t>Answer</a:t>
-            </a:r>
-            <a:r>
-              <a:rPr/>
-              <a:t> </a:t>
-            </a:r>
-            <a:r>
-              <a:rPr/>
-              <a:t>2</a:t>
+              <a:t>Exercise</a:t>
             </a:r>
           </a:p>
         </p:txBody>
@@ -7955,11 +7899,30 @@
           <a:bodyPr/>
           <a:lstStyle/>
           <a:p>
-            <a:pPr lvl="0" marL="0" indent="0">
-              <a:buNone/>
+            <a:pPr lvl="1">
+              <a:buAutoNum type="arabicPeriod"/>
             </a:pPr>
             <a:r>
               <a:rPr/>
+              <a:t>What types of variables do you have in </a:t>
+            </a:r>
+            <a:r>
+              <a:rPr sz="1800">
+                <a:latin typeface="Courier"/>
+              </a:rPr>
+              <a:t>cchic</a:t>
+            </a:r>
+            <a:r>
+              <a:rPr/>
+              <a:t>?</a:t>
+            </a:r>
+          </a:p>
+          <a:p>
+            <a:pPr lvl="1">
+              <a:buAutoNum type="arabicPeriod"/>
+            </a:pPr>
+            <a:r>
+              <a:rPr/>
               <a:t>Display the </a:t>
             </a:r>
             <a:r>
@@ -7970,7 +7933,7 @@
             </a:r>
             <a:r>
               <a:rPr/>
-              <a:t> vector in </a:t>
+              <a:t> vector from in </a:t>
             </a:r>
             <a:r>
               <a:rPr sz="1800">
@@ -7984,29 +7947,49 @@
             </a:r>
           </a:p>
           <a:p>
-            <a:pPr lvl="0" marL="1270000" indent="0">
-              <a:buNone/>
+            <a:pPr lvl="1">
+              <a:buAutoNum type="arabicPeriod"/>
             </a:pPr>
             <a:r>
+              <a:rPr/>
+              <a:t>How many men and women are in the database?</a:t>
+            </a:r>
+          </a:p>
+          <a:p>
+            <a:pPr lvl="1">
+              <a:buAutoNum type="arabicPeriod"/>
+            </a:pPr>
+            <a:r>
+              <a:rPr/>
+              <a:t>How many survived and how many died?</a:t>
+            </a:r>
+          </a:p>
+          <a:p>
+            <a:pPr lvl="2">
+              <a:buAutoNum type="alphaLcParenR"/>
+            </a:pPr>
+            <a:r>
+              <a:rPr/>
+              <a:t>What does the function </a:t>
+            </a:r>
+            <a:r>
               <a:rPr sz="1800">
                 <a:latin typeface="Courier"/>
               </a:rPr>
-              <a:t>cchic</a:t>
-            </a:r>
-            <a:r>
-              <a:rPr sz="1800">
-                <a:solidFill>
-                  <a:srgbClr val="666666"/>
-                </a:solidFill>
-                <a:latin typeface="Courier"/>
-              </a:rPr>
-              <a:t>$</a:t>
-            </a:r>
-            <a:r>
-              <a:rPr sz="1800">
-                <a:latin typeface="Courier"/>
-              </a:rPr>
-              <a:t>discharge_dttm</a:t>
+              <a:t>ls()</a:t>
+            </a:r>
+            <a:r>
+              <a:rPr/>
+              <a:t> do?</a:t>
+            </a:r>
+          </a:p>
+          <a:p>
+            <a:pPr lvl="2">
+              <a:buAutoNum type="alphaLcParenR"/>
+            </a:pPr>
+            <a:r>
+              <a:rPr/>
+              <a:t>Use it to see how many vectors contain information about “temp”.</a:t>
             </a:r>
           </a:p>
         </p:txBody>
@@ -8067,7 +8050,7 @@
             </a:r>
             <a:r>
               <a:rPr/>
-              <a:t>3</a:t>
+              <a:t>1.</a:t>
             </a:r>
           </a:p>
         </p:txBody>
@@ -8098,7 +8081,17 @@
             </a:pPr>
             <a:r>
               <a:rPr/>
-              <a:t>How many men and women are in the database?</a:t>
+              <a:t>What types of variables do you have in </a:t>
+            </a:r>
+            <a:r>
+              <a:rPr sz="1800">
+                <a:latin typeface="Courier"/>
+              </a:rPr>
+              <a:t>cchic</a:t>
+            </a:r>
+            <a:r>
+              <a:rPr/>
+              <a:t>?</a:t>
             </a:r>
           </a:p>
           <a:p>
@@ -8112,41 +8105,13 @@
                 </a:solidFill>
                 <a:latin typeface="Courier"/>
               </a:rPr>
-              <a:t>table</a:t>
+              <a:t>str</a:t>
             </a:r>
             <a:r>
               <a:rPr sz="1800">
                 <a:latin typeface="Courier"/>
               </a:rPr>
-              <a:t>(cchic</a:t>
-            </a:r>
-            <a:r>
-              <a:rPr sz="1800">
-                <a:solidFill>
-                  <a:srgbClr val="666666"/>
-                </a:solidFill>
-                <a:latin typeface="Courier"/>
-              </a:rPr>
-              <a:t>$</a:t>
-            </a:r>
-            <a:r>
-              <a:rPr sz="1800">
-                <a:latin typeface="Courier"/>
-              </a:rPr>
-              <a:t>sex)</a:t>
-            </a:r>
-          </a:p>
-          <a:p>
-            <a:pPr lvl="0" marL="1270000" indent="0">
-              <a:buNone/>
-            </a:pPr>
-            <a:r>
-              <a:rPr sz="1800">
-                <a:latin typeface="Courier"/>
-              </a:rPr>
-              <a:t>## 
-##    F    M 
-## 2246 2754</a:t>
+              <a:t>(cchic)</a:t>
             </a:r>
           </a:p>
         </p:txBody>
@@ -8207,7 +8172,7 @@
             </a:r>
             <a:r>
               <a:rPr/>
-              <a:t>4</a:t>
+              <a:t>2</a:t>
             </a:r>
           </a:p>
         </p:txBody>
@@ -8238,7 +8203,27 @@
             </a:pPr>
             <a:r>
               <a:rPr/>
-              <a:t>How many survived and how many died?</a:t>
+              <a:t>Display the </a:t>
+            </a:r>
+            <a:r>
+              <a:rPr sz="1800">
+                <a:latin typeface="Courier"/>
+              </a:rPr>
+              <a:t>discharge_dttm</a:t>
+            </a:r>
+            <a:r>
+              <a:rPr/>
+              <a:t> vector in </a:t>
+            </a:r>
+            <a:r>
+              <a:rPr sz="1800">
+                <a:latin typeface="Courier"/>
+              </a:rPr>
+              <a:t>cchic</a:t>
+            </a:r>
+            <a:r>
+              <a:rPr/>
+              <a:t>.</a:t>
             </a:r>
           </a:p>
           <a:p>
@@ -8246,19 +8231,10 @@
               <a:buNone/>
             </a:pPr>
             <a:r>
-              <a:rPr sz="1800" b="1">
-                <a:solidFill>
-                  <a:srgbClr val="007020"/>
-                </a:solidFill>
-                <a:latin typeface="Courier"/>
-              </a:rPr>
-              <a:t>table</a:t>
-            </a:r>
-            <a:r>
               <a:rPr sz="1800">
                 <a:latin typeface="Courier"/>
               </a:rPr>
-              <a:t>(cchic</a:t>
+              <a:t>cchic</a:t>
             </a:r>
             <a:r>
               <a:rPr sz="1800">
@@ -8273,20 +8249,7 @@
               <a:rPr sz="1800">
                 <a:latin typeface="Courier"/>
               </a:rPr>
-              <a:t>vital_status)</a:t>
-            </a:r>
-          </a:p>
-          <a:p>
-            <a:pPr lvl="0" marL="1270000" indent="0">
-              <a:buNone/>
-            </a:pPr>
-            <a:r>
-              <a:rPr sz="1800">
-                <a:latin typeface="Courier"/>
-              </a:rPr>
-              <a:t>## 
-##    A    D 
-## 4444  556</a:t>
+              <a:t>discharge_dttm</a:t>
             </a:r>
           </a:p>
         </p:txBody>
@@ -8297,6 +8260,286 @@
 </file>
 
 <file path=ppt/slides/slide34.xml><?xml version="1.0" encoding="utf-8"?>
+<p:sld xmlns:a="http://schemas.openxmlformats.org/drawingml/2006/main" xmlns:r="http://schemas.openxmlformats.org/officeDocument/2006/relationships" xmlns:p="http://schemas.openxmlformats.org/presentationml/2006/main">
+  <p:cSld>
+    <p:spTree>
+      <p:nvGrpSpPr>
+        <p:cNvPr id="1" name=""/>
+        <p:cNvGrpSpPr/>
+        <p:nvPr/>
+      </p:nvGrpSpPr>
+      <p:grpSpPr>
+        <a:xfrm>
+          <a:off x="0" y="0"/>
+          <a:ext cx="0" cy="0"/>
+          <a:chOff x="0" y="0"/>
+          <a:chExt cx="0" cy="0"/>
+        </a:xfrm>
+      </p:grpSpPr>
+      <p:sp>
+        <p:nvSpPr>
+          <p:cNvPr id="2" name="Title 1">
+            <a:extLst>
+              <a:ext uri="{FF2B5EF4-FFF2-40B4-BE49-F238E27FC236}">
+                <a16:creationId xmlns:a16="http://schemas.microsoft.com/office/drawing/2014/main" id="{5567D468-EE70-CD4E-A3AC-039CC11EF1FB}"/>
+              </a:ext>
+            </a:extLst>
+          </p:cNvPr>
+          <p:cNvSpPr>
+            <a:spLocks noGrp="1"/>
+          </p:cNvSpPr>
+          <p:nvPr>
+            <p:ph type="title"/>
+          </p:nvPr>
+        </p:nvSpPr>
+        <p:spPr/>
+        <p:txBody>
+          <a:bodyPr/>
+          <a:lstStyle/>
+          <a:p>
+            <a:pPr lvl="0" marL="0" indent="0">
+              <a:buNone/>
+            </a:pPr>
+            <a:r>
+              <a:rPr/>
+              <a:t>Answer</a:t>
+            </a:r>
+            <a:r>
+              <a:rPr/>
+              <a:t> </a:t>
+            </a:r>
+            <a:r>
+              <a:rPr/>
+              <a:t>3</a:t>
+            </a:r>
+          </a:p>
+        </p:txBody>
+      </p:sp>
+      <p:sp>
+        <p:nvSpPr>
+          <p:cNvPr id="3" name="Content Placeholder 2">
+            <a:extLst>
+              <a:ext uri="{FF2B5EF4-FFF2-40B4-BE49-F238E27FC236}">
+                <a16:creationId xmlns:a16="http://schemas.microsoft.com/office/drawing/2014/main" id="{D10DDA37-E46B-B641-BC9F-636CB92A2C08}"/>
+              </a:ext>
+            </a:extLst>
+          </p:cNvPr>
+          <p:cNvSpPr>
+            <a:spLocks noGrp="1"/>
+          </p:cNvSpPr>
+          <p:nvPr>
+            <p:ph idx="1"/>
+          </p:nvPr>
+        </p:nvSpPr>
+        <p:spPr/>
+        <p:txBody>
+          <a:bodyPr/>
+          <a:lstStyle/>
+          <a:p>
+            <a:pPr lvl="0" marL="0" indent="0">
+              <a:buNone/>
+            </a:pPr>
+            <a:r>
+              <a:rPr/>
+              <a:t>How many men and women are in the database?</a:t>
+            </a:r>
+          </a:p>
+          <a:p>
+            <a:pPr lvl="0" marL="1270000" indent="0">
+              <a:buNone/>
+            </a:pPr>
+            <a:r>
+              <a:rPr sz="1800" b="1">
+                <a:solidFill>
+                  <a:srgbClr val="007020"/>
+                </a:solidFill>
+                <a:latin typeface="Courier"/>
+              </a:rPr>
+              <a:t>table</a:t>
+            </a:r>
+            <a:r>
+              <a:rPr sz="1800">
+                <a:latin typeface="Courier"/>
+              </a:rPr>
+              <a:t>(cchic</a:t>
+            </a:r>
+            <a:r>
+              <a:rPr sz="1800">
+                <a:solidFill>
+                  <a:srgbClr val="666666"/>
+                </a:solidFill>
+                <a:latin typeface="Courier"/>
+              </a:rPr>
+              <a:t>$</a:t>
+            </a:r>
+            <a:r>
+              <a:rPr sz="1800">
+                <a:latin typeface="Courier"/>
+              </a:rPr>
+              <a:t>sex)</a:t>
+            </a:r>
+          </a:p>
+          <a:p>
+            <a:pPr lvl="0" marL="1270000" indent="0">
+              <a:buNone/>
+            </a:pPr>
+            <a:r>
+              <a:rPr sz="1800">
+                <a:latin typeface="Courier"/>
+              </a:rPr>
+              <a:t>## 
+##    F    M 
+## 2246 2754</a:t>
+            </a:r>
+          </a:p>
+        </p:txBody>
+      </p:sp>
+    </p:spTree>
+  </p:cSld>
+</p:sld>
+</file>
+
+<file path=ppt/slides/slide35.xml><?xml version="1.0" encoding="utf-8"?>
+<p:sld xmlns:a="http://schemas.openxmlformats.org/drawingml/2006/main" xmlns:r="http://schemas.openxmlformats.org/officeDocument/2006/relationships" xmlns:p="http://schemas.openxmlformats.org/presentationml/2006/main">
+  <p:cSld>
+    <p:spTree>
+      <p:nvGrpSpPr>
+        <p:cNvPr id="1" name=""/>
+        <p:cNvGrpSpPr/>
+        <p:nvPr/>
+      </p:nvGrpSpPr>
+      <p:grpSpPr>
+        <a:xfrm>
+          <a:off x="0" y="0"/>
+          <a:ext cx="0" cy="0"/>
+          <a:chOff x="0" y="0"/>
+          <a:chExt cx="0" cy="0"/>
+        </a:xfrm>
+      </p:grpSpPr>
+      <p:sp>
+        <p:nvSpPr>
+          <p:cNvPr id="2" name="Title 1">
+            <a:extLst>
+              <a:ext uri="{FF2B5EF4-FFF2-40B4-BE49-F238E27FC236}">
+                <a16:creationId xmlns:a16="http://schemas.microsoft.com/office/drawing/2014/main" id="{5567D468-EE70-CD4E-A3AC-039CC11EF1FB}"/>
+              </a:ext>
+            </a:extLst>
+          </p:cNvPr>
+          <p:cNvSpPr>
+            <a:spLocks noGrp="1"/>
+          </p:cNvSpPr>
+          <p:nvPr>
+            <p:ph type="title"/>
+          </p:nvPr>
+        </p:nvSpPr>
+        <p:spPr/>
+        <p:txBody>
+          <a:bodyPr/>
+          <a:lstStyle/>
+          <a:p>
+            <a:pPr lvl="0" marL="0" indent="0">
+              <a:buNone/>
+            </a:pPr>
+            <a:r>
+              <a:rPr/>
+              <a:t>Answer</a:t>
+            </a:r>
+            <a:r>
+              <a:rPr/>
+              <a:t> </a:t>
+            </a:r>
+            <a:r>
+              <a:rPr/>
+              <a:t>4</a:t>
+            </a:r>
+          </a:p>
+        </p:txBody>
+      </p:sp>
+      <p:sp>
+        <p:nvSpPr>
+          <p:cNvPr id="3" name="Content Placeholder 2">
+            <a:extLst>
+              <a:ext uri="{FF2B5EF4-FFF2-40B4-BE49-F238E27FC236}">
+                <a16:creationId xmlns:a16="http://schemas.microsoft.com/office/drawing/2014/main" id="{D10DDA37-E46B-B641-BC9F-636CB92A2C08}"/>
+              </a:ext>
+            </a:extLst>
+          </p:cNvPr>
+          <p:cNvSpPr>
+            <a:spLocks noGrp="1"/>
+          </p:cNvSpPr>
+          <p:nvPr>
+            <p:ph idx="1"/>
+          </p:nvPr>
+        </p:nvSpPr>
+        <p:spPr/>
+        <p:txBody>
+          <a:bodyPr/>
+          <a:lstStyle/>
+          <a:p>
+            <a:pPr lvl="0" marL="0" indent="0">
+              <a:buNone/>
+            </a:pPr>
+            <a:r>
+              <a:rPr/>
+              <a:t>How many survived and how many died?</a:t>
+            </a:r>
+          </a:p>
+          <a:p>
+            <a:pPr lvl="0" marL="1270000" indent="0">
+              <a:buNone/>
+            </a:pPr>
+            <a:r>
+              <a:rPr sz="1800" b="1">
+                <a:solidFill>
+                  <a:srgbClr val="007020"/>
+                </a:solidFill>
+                <a:latin typeface="Courier"/>
+              </a:rPr>
+              <a:t>table</a:t>
+            </a:r>
+            <a:r>
+              <a:rPr sz="1800">
+                <a:latin typeface="Courier"/>
+              </a:rPr>
+              <a:t>(cchic</a:t>
+            </a:r>
+            <a:r>
+              <a:rPr sz="1800">
+                <a:solidFill>
+                  <a:srgbClr val="666666"/>
+                </a:solidFill>
+                <a:latin typeface="Courier"/>
+              </a:rPr>
+              <a:t>$</a:t>
+            </a:r>
+            <a:r>
+              <a:rPr sz="1800">
+                <a:latin typeface="Courier"/>
+              </a:rPr>
+              <a:t>vital_status)</a:t>
+            </a:r>
+          </a:p>
+          <a:p>
+            <a:pPr lvl="0" marL="1270000" indent="0">
+              <a:buNone/>
+            </a:pPr>
+            <a:r>
+              <a:rPr sz="1800">
+                <a:latin typeface="Courier"/>
+              </a:rPr>
+              <a:t>## 
+##    A    D 
+## 4444  556</a:t>
+            </a:r>
+          </a:p>
+        </p:txBody>
+      </p:sp>
+    </p:spTree>
+  </p:cSld>
+</p:sld>
+</file>
+
+<file path=ppt/slides/slide36.xml><?xml version="1.0" encoding="utf-8"?>
 <p:sld xmlns:a="http://schemas.openxmlformats.org/drawingml/2006/main" xmlns:r="http://schemas.openxmlformats.org/officeDocument/2006/relationships" xmlns:p="http://schemas.openxmlformats.org/presentationml/2006/main">
   <p:cSld>
     <p:spTree>

</xml_diff>